<commit_message>
Modify 3 & 5 && + Exercise 6
</commit_message>
<xml_diff>
--- a/Exercise 2/E2.pptx
+++ b/Exercise 2/E2.pptx
@@ -268,7 +268,7 @@
           <a:p>
             <a:fld id="{E17F7779-9C11-46A1-9C91-FCD18852C054}" type="datetimeFigureOut">
               <a:rPr lang="en-GB" smtClean="0"/>
-              <a:t>30/12/2023</a:t>
+              <a:t>31/12/2023</a:t>
             </a:fld>
             <a:endParaRPr lang="en-GB"/>
           </a:p>
@@ -466,7 +466,7 @@
           <a:p>
             <a:fld id="{E17F7779-9C11-46A1-9C91-FCD18852C054}" type="datetimeFigureOut">
               <a:rPr lang="en-GB" smtClean="0"/>
-              <a:t>30/12/2023</a:t>
+              <a:t>31/12/2023</a:t>
             </a:fld>
             <a:endParaRPr lang="en-GB"/>
           </a:p>
@@ -674,7 +674,7 @@
           <a:p>
             <a:fld id="{E17F7779-9C11-46A1-9C91-FCD18852C054}" type="datetimeFigureOut">
               <a:rPr lang="en-GB" smtClean="0"/>
-              <a:t>30/12/2023</a:t>
+              <a:t>31/12/2023</a:t>
             </a:fld>
             <a:endParaRPr lang="en-GB"/>
           </a:p>
@@ -872,7 +872,7 @@
           <a:p>
             <a:fld id="{E17F7779-9C11-46A1-9C91-FCD18852C054}" type="datetimeFigureOut">
               <a:rPr lang="en-GB" smtClean="0"/>
-              <a:t>30/12/2023</a:t>
+              <a:t>31/12/2023</a:t>
             </a:fld>
             <a:endParaRPr lang="en-GB"/>
           </a:p>
@@ -1147,7 +1147,7 @@
           <a:p>
             <a:fld id="{E17F7779-9C11-46A1-9C91-FCD18852C054}" type="datetimeFigureOut">
               <a:rPr lang="en-GB" smtClean="0"/>
-              <a:t>30/12/2023</a:t>
+              <a:t>31/12/2023</a:t>
             </a:fld>
             <a:endParaRPr lang="en-GB"/>
           </a:p>
@@ -1412,7 +1412,7 @@
           <a:p>
             <a:fld id="{E17F7779-9C11-46A1-9C91-FCD18852C054}" type="datetimeFigureOut">
               <a:rPr lang="en-GB" smtClean="0"/>
-              <a:t>30/12/2023</a:t>
+              <a:t>31/12/2023</a:t>
             </a:fld>
             <a:endParaRPr lang="en-GB"/>
           </a:p>
@@ -1824,7 +1824,7 @@
           <a:p>
             <a:fld id="{E17F7779-9C11-46A1-9C91-FCD18852C054}" type="datetimeFigureOut">
               <a:rPr lang="en-GB" smtClean="0"/>
-              <a:t>30/12/2023</a:t>
+              <a:t>31/12/2023</a:t>
             </a:fld>
             <a:endParaRPr lang="en-GB"/>
           </a:p>
@@ -1965,7 +1965,7 @@
           <a:p>
             <a:fld id="{E17F7779-9C11-46A1-9C91-FCD18852C054}" type="datetimeFigureOut">
               <a:rPr lang="en-GB" smtClean="0"/>
-              <a:t>30/12/2023</a:t>
+              <a:t>31/12/2023</a:t>
             </a:fld>
             <a:endParaRPr lang="en-GB"/>
           </a:p>
@@ -2078,7 +2078,7 @@
           <a:p>
             <a:fld id="{E17F7779-9C11-46A1-9C91-FCD18852C054}" type="datetimeFigureOut">
               <a:rPr lang="en-GB" smtClean="0"/>
-              <a:t>30/12/2023</a:t>
+              <a:t>31/12/2023</a:t>
             </a:fld>
             <a:endParaRPr lang="en-GB"/>
           </a:p>
@@ -2389,7 +2389,7 @@
           <a:p>
             <a:fld id="{E17F7779-9C11-46A1-9C91-FCD18852C054}" type="datetimeFigureOut">
               <a:rPr lang="en-GB" smtClean="0"/>
-              <a:t>30/12/2023</a:t>
+              <a:t>31/12/2023</a:t>
             </a:fld>
             <a:endParaRPr lang="en-GB"/>
           </a:p>
@@ -2677,7 +2677,7 @@
           <a:p>
             <a:fld id="{E17F7779-9C11-46A1-9C91-FCD18852C054}" type="datetimeFigureOut">
               <a:rPr lang="en-GB" smtClean="0"/>
-              <a:t>30/12/2023</a:t>
+              <a:t>31/12/2023</a:t>
             </a:fld>
             <a:endParaRPr lang="en-GB"/>
           </a:p>
@@ -2918,7 +2918,7 @@
           <a:p>
             <a:fld id="{E17F7779-9C11-46A1-9C91-FCD18852C054}" type="datetimeFigureOut">
               <a:rPr lang="en-GB" smtClean="0"/>
-              <a:t>30/12/2023</a:t>
+              <a:t>31/12/2023</a:t>
             </a:fld>
             <a:endParaRPr lang="en-GB"/>
           </a:p>
@@ -3633,6 +3633,12 @@
                           </a:rPr>
                           <m:t>𝑓</m:t>
                         </m:r>
+                        <m:r>
+                          <a:rPr lang="en-GB" b="0" i="1" smtClean="0">
+                            <a:latin typeface="Cambria Math" panose="02040503050406030204" pitchFamily="18" charset="0"/>
+                          </a:rPr>
+                          <m:t>𝑑</m:t>
+                        </m:r>
                       </m:sub>
                     </m:sSub>
                     <m:r>
@@ -3704,13 +3710,8 @@
               <a:p>
                 <a:r>
                   <a:rPr lang="en-GB" dirty="0"/>
-                  <a:t>Nothing else seem to </a:t>
+                  <a:t>Nothing else seem to change significantly.</a:t>
                 </a:r>
-                <a:r>
-                  <a:rPr lang="en-GB"/>
-                  <a:t>change significantly.</a:t>
-                </a:r>
-                <a:endParaRPr lang="en-GB" dirty="0"/>
               </a:p>
             </p:txBody>
           </p:sp>
@@ -3847,8 +3848,8 @@
           </a:p>
         </p:txBody>
       </p:sp>
-      <mc:AlternateContent xmlns:mc="http://schemas.openxmlformats.org/markup-compatibility/2006" xmlns:a14="http://schemas.microsoft.com/office/drawing/2010/main">
-        <mc:Choice Requires="a14">
+      <mc:AlternateContent xmlns:mc="http://schemas.openxmlformats.org/markup-compatibility/2006">
+        <mc:Choice xmlns:a14="http://schemas.microsoft.com/office/drawing/2010/main" Requires="a14">
           <p:sp>
             <p:nvSpPr>
               <p:cNvPr id="6" name="TextBox 5">
@@ -3864,7 +3865,7 @@
             <p:spPr>
               <a:xfrm>
                 <a:off x="751288" y="5792169"/>
-                <a:ext cx="2172325" cy="557717"/>
+                <a:ext cx="10342062" cy="557717"/>
               </a:xfrm>
               <a:prstGeom prst="rect">
                 <a:avLst/>
@@ -3879,57 +3880,99 @@
               <a:p>
                 <a:pPr/>
                 <a14:m>
-                  <m:oMathPara xmlns:m="http://schemas.openxmlformats.org/officeDocument/2006/math">
-                    <m:oMathParaPr>
-                      <m:jc m:val="centerGroup"/>
-                    </m:oMathParaPr>
-                    <m:oMath xmlns:m="http://schemas.openxmlformats.org/officeDocument/2006/math">
-                      <m:sSub>
-                        <m:sSubPr>
-                          <m:ctrlPr>
-                            <a:rPr lang="en-GB" sz="2800" b="0" i="1" dirty="0" smtClean="0">
-                              <a:latin typeface="Cambria Math" panose="02040503050406030204" pitchFamily="18" charset="0"/>
-                            </a:rPr>
-                          </m:ctrlPr>
-                        </m:sSubPr>
-                        <m:e>
-                          <m:r>
-                            <a:rPr lang="en-GB" sz="2800" b="0" i="1" dirty="0" smtClean="0">
-                              <a:latin typeface="Cambria Math" panose="02040503050406030204" pitchFamily="18" charset="0"/>
-                            </a:rPr>
-                            <m:t>𝑉</m:t>
-                          </m:r>
-                        </m:e>
-                        <m:sub>
-                          <m:r>
-                            <a:rPr lang="en-GB" sz="2800" b="0" i="1" dirty="0" smtClean="0">
-                              <a:latin typeface="Cambria Math" panose="02040503050406030204" pitchFamily="18" charset="0"/>
-                            </a:rPr>
-                            <m:t>𝑓</m:t>
-                          </m:r>
-                        </m:sub>
-                      </m:sSub>
-                      <m:r>
-                        <a:rPr lang="en-GB" sz="2800" b="0" i="1" dirty="0" smtClean="0">
-                          <a:latin typeface="Cambria Math" panose="02040503050406030204" pitchFamily="18" charset="0"/>
-                        </a:rPr>
-                        <m:t>=0.729</m:t>
-                      </m:r>
-                      <m:r>
-                        <a:rPr lang="en-GB" sz="2800" b="0" i="1" dirty="0" smtClean="0">
-                          <a:latin typeface="Cambria Math" panose="02040503050406030204" pitchFamily="18" charset="0"/>
-                        </a:rPr>
-                        <m:t>𝑉</m:t>
-                      </m:r>
-                    </m:oMath>
-                  </m:oMathPara>
+                  <m:oMath xmlns:m="http://schemas.openxmlformats.org/officeDocument/2006/math">
+                    <m:sSub>
+                      <m:sSubPr>
+                        <m:ctrlPr>
+                          <a:rPr lang="en-GB" sz="2800" b="0" i="1" dirty="0" smtClean="0">
+                            <a:latin typeface="Cambria Math" panose="02040503050406030204" pitchFamily="18" charset="0"/>
+                          </a:rPr>
+                        </m:ctrlPr>
+                      </m:sSubPr>
+                      <m:e>
+                        <m:r>
+                          <a:rPr lang="en-GB" sz="2800" b="0" i="1" dirty="0" smtClean="0">
+                            <a:latin typeface="Cambria Math" panose="02040503050406030204" pitchFamily="18" charset="0"/>
+                          </a:rPr>
+                          <m:t>𝑉</m:t>
+                        </m:r>
+                      </m:e>
+                      <m:sub>
+                        <m:r>
+                          <a:rPr lang="en-GB" sz="2800" b="0" i="1" dirty="0" smtClean="0">
+                            <a:latin typeface="Cambria Math" panose="02040503050406030204" pitchFamily="18" charset="0"/>
+                          </a:rPr>
+                          <m:t>𝑓</m:t>
+                        </m:r>
+                        <m:r>
+                          <a:rPr lang="en-GB" sz="2800" b="0" i="1" dirty="0" smtClean="0">
+                            <a:latin typeface="Cambria Math" panose="02040503050406030204" pitchFamily="18" charset="0"/>
+                          </a:rPr>
+                          <m:t>𝑑</m:t>
+                        </m:r>
+                      </m:sub>
+                    </m:sSub>
+                    <m:r>
+                      <a:rPr lang="en-GB" sz="2800" b="0" i="1" dirty="0" smtClean="0">
+                        <a:latin typeface="Cambria Math" panose="02040503050406030204" pitchFamily="18" charset="0"/>
+                      </a:rPr>
+                      <m:t>=0.729</m:t>
+                    </m:r>
+                    <m:r>
+                      <a:rPr lang="en-GB" sz="2800" b="0" i="1" dirty="0" smtClean="0">
+                        <a:latin typeface="Cambria Math" panose="02040503050406030204" pitchFamily="18" charset="0"/>
+                      </a:rPr>
+                      <m:t>𝑉</m:t>
+                    </m:r>
+                  </m:oMath>
                 </a14:m>
+                <a:r>
+                  <a:rPr lang="en-GB" sz="2800" dirty="0"/>
+                  <a:t> (Note: </a:t>
+                </a:r>
+                <a14:m>
+                  <m:oMath xmlns:m="http://schemas.openxmlformats.org/officeDocument/2006/math">
+                    <m:sSub>
+                      <m:sSubPr>
+                        <m:ctrlPr>
+                          <a:rPr lang="en-GB" sz="2800" b="0" i="1" dirty="0" smtClean="0">
+                            <a:latin typeface="Cambria Math" panose="02040503050406030204" pitchFamily="18" charset="0"/>
+                          </a:rPr>
+                        </m:ctrlPr>
+                      </m:sSubPr>
+                      <m:e>
+                        <m:r>
+                          <a:rPr lang="en-GB" sz="2800" i="1" dirty="0" smtClean="0">
+                            <a:latin typeface="Cambria Math" panose="02040503050406030204" pitchFamily="18" charset="0"/>
+                          </a:rPr>
+                          <m:t>𝑉</m:t>
+                        </m:r>
+                      </m:e>
+                      <m:sub>
+                        <m:r>
+                          <a:rPr lang="en-GB" sz="2800" b="0" i="1" dirty="0" smtClean="0">
+                            <a:latin typeface="Cambria Math" panose="02040503050406030204" pitchFamily="18" charset="0"/>
+                          </a:rPr>
+                          <m:t>𝑓𝑑</m:t>
+                        </m:r>
+                      </m:sub>
+                    </m:sSub>
+                  </m:oMath>
+                </a14:m>
+                <a:r>
+                  <a:rPr lang="en-GB" sz="2800" dirty="0"/>
+                  <a:t> is forward biased voltage </a:t>
+                </a:r>
+                <a:r>
+                  <a:rPr lang="en-GB" sz="2800"/>
+                  <a:t>drop across diode)</a:t>
+                </a:r>
                 <a:endParaRPr lang="en-GB" sz="2800" dirty="0"/>
               </a:p>
             </p:txBody>
           </p:sp>
         </mc:Choice>
-        <mc:Fallback xmlns="">
+        <mc:Fallback>
           <p:sp>
             <p:nvSpPr>
               <p:cNvPr id="6" name="TextBox 5">
@@ -3947,7 +3990,7 @@
             <p:spPr>
               <a:xfrm>
                 <a:off x="751288" y="5792169"/>
-                <a:ext cx="2172325" cy="557717"/>
+                <a:ext cx="10342062" cy="557717"/>
               </a:xfrm>
               <a:prstGeom prst="rect">
                 <a:avLst/>
@@ -3955,7 +3998,7 @@
               <a:blipFill>
                 <a:blip r:embed="rId2"/>
                 <a:stretch>
-                  <a:fillRect/>
+                  <a:fillRect t="-9783" r="-177" b="-23913"/>
                 </a:stretch>
               </a:blipFill>
             </p:spPr>
@@ -4062,8 +4105,8 @@
           </a:p>
         </p:txBody>
       </p:sp>
-      <mc:AlternateContent xmlns:mc="http://schemas.openxmlformats.org/markup-compatibility/2006" xmlns:a14="http://schemas.microsoft.com/office/drawing/2010/main">
-        <mc:Choice Requires="a14">
+      <mc:AlternateContent xmlns:mc="http://schemas.openxmlformats.org/markup-compatibility/2006">
+        <mc:Choice xmlns:a14="http://schemas.microsoft.com/office/drawing/2010/main" Requires="a14">
           <p:sp>
             <p:nvSpPr>
               <p:cNvPr id="3" name="Content Placeholder 2">
@@ -4121,6 +4164,12 @@
                             <a:latin typeface="Cambria Math" panose="02040503050406030204" pitchFamily="18" charset="0"/>
                           </a:rPr>
                           <m:t>𝑓</m:t>
+                        </m:r>
+                        <m:r>
+                          <a:rPr lang="en-GB" b="0" i="1" dirty="0" smtClean="0">
+                            <a:latin typeface="Cambria Math" panose="02040503050406030204" pitchFamily="18" charset="0"/>
+                          </a:rPr>
+                          <m:t>𝑑</m:t>
                         </m:r>
                       </m:sub>
                     </m:sSub>
@@ -4218,6 +4267,12 @@
                                 <a:latin typeface="Cambria Math" panose="02040503050406030204" pitchFamily="18" charset="0"/>
                               </a:rPr>
                               <m:t>𝑓</m:t>
+                            </m:r>
+                            <m:r>
+                              <a:rPr lang="en-GB" b="0" i="1" smtClean="0">
+                                <a:latin typeface="Cambria Math" panose="02040503050406030204" pitchFamily="18" charset="0"/>
+                              </a:rPr>
+                              <m:t>𝑑</m:t>
                             </m:r>
                           </m:sub>
                         </m:sSub>
@@ -4333,6 +4388,12 @@
                           </a:rPr>
                           <m:t>𝑓</m:t>
                         </m:r>
+                        <m:r>
+                          <a:rPr lang="en-GB" b="0" i="1" smtClean="0">
+                            <a:latin typeface="Cambria Math" panose="02040503050406030204" pitchFamily="18" charset="0"/>
+                          </a:rPr>
+                          <m:t>𝑑</m:t>
+                        </m:r>
                       </m:sub>
                     </m:sSub>
                     <m:r>
@@ -4370,7 +4431,7 @@
             </p:txBody>
           </p:sp>
         </mc:Choice>
-        <mc:Fallback xmlns="">
+        <mc:Fallback>
           <p:sp>
             <p:nvSpPr>
               <p:cNvPr id="3" name="Content Placeholder 2">
@@ -4468,8 +4529,8 @@
           </a:p>
         </p:txBody>
       </p:sp>
-      <mc:AlternateContent xmlns:mc="http://schemas.openxmlformats.org/markup-compatibility/2006" xmlns:a14="http://schemas.microsoft.com/office/drawing/2010/main">
-        <mc:Choice Requires="a14">
+      <mc:AlternateContent xmlns:mc="http://schemas.openxmlformats.org/markup-compatibility/2006">
+        <mc:Choice xmlns:a14="http://schemas.microsoft.com/office/drawing/2010/main" Requires="a14">
           <p:sp>
             <p:nvSpPr>
               <p:cNvPr id="3" name="Content Placeholder 2">
@@ -4527,6 +4588,12 @@
                           </a:rPr>
                           <m:t>𝑓</m:t>
                         </m:r>
+                        <m:r>
+                          <a:rPr lang="en-GB" b="0" i="1" smtClean="0">
+                            <a:latin typeface="Cambria Math" panose="02040503050406030204" pitchFamily="18" charset="0"/>
+                          </a:rPr>
+                          <m:t>𝑑</m:t>
+                        </m:r>
                       </m:sub>
                     </m:sSub>
                     <m:r>
@@ -4554,7 +4621,7 @@
             </p:txBody>
           </p:sp>
         </mc:Choice>
-        <mc:Fallback xmlns="">
+        <mc:Fallback>
           <p:sp>
             <p:nvSpPr>
               <p:cNvPr id="3" name="Content Placeholder 2">
@@ -4686,8 +4753,8 @@
           </a:p>
         </p:txBody>
       </p:sp>
-      <mc:AlternateContent xmlns:mc="http://schemas.openxmlformats.org/markup-compatibility/2006" xmlns:a14="http://schemas.microsoft.com/office/drawing/2010/main">
-        <mc:Choice Requires="a14">
+      <mc:AlternateContent xmlns:mc="http://schemas.openxmlformats.org/markup-compatibility/2006">
+        <mc:Choice xmlns:a14="http://schemas.microsoft.com/office/drawing/2010/main" Requires="a14">
           <p:sp>
             <p:nvSpPr>
               <p:cNvPr id="3" name="Content Placeholder 2">
@@ -4745,6 +4812,12 @@
                           </a:rPr>
                           <m:t>𝑓</m:t>
                         </m:r>
+                        <m:r>
+                          <a:rPr lang="en-GB" b="0" i="1" smtClean="0">
+                            <a:latin typeface="Cambria Math" panose="02040503050406030204" pitchFamily="18" charset="0"/>
+                          </a:rPr>
+                          <m:t>𝑑</m:t>
+                        </m:r>
                       </m:sub>
                     </m:sSub>
                     <m:r>
@@ -4772,7 +4845,7 @@
             </p:txBody>
           </p:sp>
         </mc:Choice>
-        <mc:Fallback xmlns="">
+        <mc:Fallback>
           <p:sp>
             <p:nvSpPr>
               <p:cNvPr id="3" name="Content Placeholder 2">
@@ -4904,8 +4977,8 @@
           </a:p>
         </p:txBody>
       </p:sp>
-      <mc:AlternateContent xmlns:mc="http://schemas.openxmlformats.org/markup-compatibility/2006" xmlns:a14="http://schemas.microsoft.com/office/drawing/2010/main">
-        <mc:Choice Requires="a14">
+      <mc:AlternateContent xmlns:mc="http://schemas.openxmlformats.org/markup-compatibility/2006">
+        <mc:Choice xmlns:a14="http://schemas.microsoft.com/office/drawing/2010/main" Requires="a14">
           <p:sp>
             <p:nvSpPr>
               <p:cNvPr id="3" name="Content Placeholder 2">
@@ -4963,6 +5036,12 @@
                           </a:rPr>
                           <m:t>𝑓</m:t>
                         </m:r>
+                        <m:r>
+                          <a:rPr lang="en-GB" b="0" i="1" smtClean="0">
+                            <a:latin typeface="Cambria Math" panose="02040503050406030204" pitchFamily="18" charset="0"/>
+                          </a:rPr>
+                          <m:t>𝑑</m:t>
+                        </m:r>
                       </m:sub>
                     </m:sSub>
                     <m:r>
@@ -4990,7 +5069,7 @@
             </p:txBody>
           </p:sp>
         </mc:Choice>
-        <mc:Fallback xmlns="">
+        <mc:Fallback>
           <p:sp>
             <p:nvSpPr>
               <p:cNvPr id="3" name="Content Placeholder 2">
@@ -5182,6 +5261,12 @@
                             <a:latin typeface="Cambria Math" panose="02040503050406030204" pitchFamily="18" charset="0"/>
                           </a:rPr>
                           <m:t>𝑓</m:t>
+                        </m:r>
+                        <m:r>
+                          <a:rPr lang="en-GB" b="0" i="1" smtClean="0">
+                            <a:latin typeface="Cambria Math" panose="02040503050406030204" pitchFamily="18" charset="0"/>
+                          </a:rPr>
+                          <m:t>𝑑</m:t>
                         </m:r>
                       </m:sub>
                     </m:sSub>
@@ -5351,8 +5436,8 @@
           </a:p>
         </p:txBody>
       </p:sp>
-      <mc:AlternateContent xmlns:mc="http://schemas.openxmlformats.org/markup-compatibility/2006" xmlns:a14="http://schemas.microsoft.com/office/drawing/2010/main">
-        <mc:Choice Requires="a14">
+      <mc:AlternateContent xmlns:mc="http://schemas.openxmlformats.org/markup-compatibility/2006">
+        <mc:Choice xmlns:a14="http://schemas.microsoft.com/office/drawing/2010/main" Requires="a14">
           <p:sp>
             <p:nvSpPr>
               <p:cNvPr id="3" name="Content Placeholder 2">
@@ -5410,6 +5495,12 @@
                           </a:rPr>
                           <m:t>𝑓</m:t>
                         </m:r>
+                        <m:r>
+                          <a:rPr lang="en-GB" b="0" i="1" smtClean="0">
+                            <a:latin typeface="Cambria Math" panose="02040503050406030204" pitchFamily="18" charset="0"/>
+                          </a:rPr>
+                          <m:t>𝑑</m:t>
+                        </m:r>
                       </m:sub>
                     </m:sSub>
                     <m:r>
@@ -5437,7 +5528,7 @@
             </p:txBody>
           </p:sp>
         </mc:Choice>
-        <mc:Fallback xmlns="">
+        <mc:Fallback>
           <p:sp>
             <p:nvSpPr>
               <p:cNvPr id="3" name="Content Placeholder 2">

</xml_diff>